<commit_message>
add functional javascript book
</commit_message>
<xml_diff>
--- a/JavaScriptFunctionObject.pptx
+++ b/JavaScriptFunctionObject.pptx
@@ -224,7 +224,7 @@
           <a:p>
             <a:fld id="{317286D4-F5AA-6C46-BE6D-415A806E88D7}" type="datetimeFigureOut">
               <a:rPr kumimoji="1" lang="zh-CN" altLang="en-US" smtClean="0"/>
-              <a:t>13-10-3</a:t>
+              <a:t>2013/10/5</a:t>
             </a:fld>
             <a:endParaRPr kumimoji="1" lang="zh-CN" altLang="en-US"/>
           </a:p>
@@ -4637,7 +4637,7 @@
             <a:fld id="{E30E2307-1E40-4E12-8716-25BFDA8E7013}" type="datetime1">
               <a:rPr lang="en-US" smtClean="0"/>
               <a:pPr/>
-              <a:t>13-10-2</a:t>
+              <a:t>10/5/2013</a:t>
             </a:fld>
             <a:endParaRPr lang="en-US"/>
           </a:p>
@@ -4820,7 +4820,7 @@
             <a:fld id="{E5CFCF5A-EA79-452C-A52C-1A2668C2E7DF}" type="datetime1">
               <a:rPr lang="en-US" smtClean="0"/>
               <a:pPr/>
-              <a:t>13-10-2</a:t>
+              <a:t>10/5/2013</a:t>
             </a:fld>
             <a:endParaRPr lang="en-US"/>
           </a:p>
@@ -4973,7 +4973,7 @@
             <a:fld id="{2E5C4C28-BD4B-4892-9A2D-6E19BD753A9A}" type="datetime1">
               <a:rPr lang="en-US" smtClean="0"/>
               <a:pPr/>
-              <a:t>13-10-2</a:t>
+              <a:t>10/5/2013</a:t>
             </a:fld>
             <a:endParaRPr lang="en-US"/>
           </a:p>
@@ -6801,7 +6801,7 @@
             <a:fld id="{61FD9D02-426E-46C9-9EE9-0DE1EF8B2838}" type="datetime1">
               <a:rPr lang="en-US" smtClean="0"/>
               <a:pPr/>
-              <a:t>13-10-2</a:t>
+              <a:t>10/5/2013</a:t>
             </a:fld>
             <a:endParaRPr lang="en-US"/>
           </a:p>
@@ -8673,7 +8673,7 @@
             <a:fld id="{7B8AEBBE-F8B2-42CF-9895-E86A608384EB}" type="datetime1">
               <a:rPr lang="en-US" smtClean="0"/>
               <a:pPr/>
-              <a:t>13-10-2</a:t>
+              <a:t>10/5/2013</a:t>
             </a:fld>
             <a:endParaRPr lang="en-US"/>
           </a:p>
@@ -8788,7 +8788,7 @@
             <a:fld id="{E1FAA6B6-10E5-4810-BC9F-DA72D8452E73}" type="datetime1">
               <a:rPr lang="en-US" smtClean="0"/>
               <a:pPr/>
-              <a:t>13-10-2</a:t>
+              <a:t>10/5/2013</a:t>
             </a:fld>
             <a:endParaRPr lang="en-US"/>
           </a:p>
@@ -9331,7 +9331,7 @@
             <a:fld id="{6D18D072-EF12-4AA2-BD71-ABC68B06D0E2}" type="datetime1">
               <a:rPr lang="en-US" smtClean="0"/>
               <a:pPr/>
-              <a:t>13-10-2</a:t>
+              <a:t>10/5/2013</a:t>
             </a:fld>
             <a:endParaRPr lang="en-US"/>
           </a:p>
@@ -9446,7 +9446,7 @@
             <a:fld id="{B8CDBF60-6CC3-4B74-A60D-3486985E4346}" type="datetime1">
               <a:rPr lang="en-US" smtClean="0"/>
               <a:pPr/>
-              <a:t>13-10-2</a:t>
+              <a:t>10/5/2013</a:t>
             </a:fld>
             <a:endParaRPr lang="en-US"/>
           </a:p>
@@ -11159,7 +11159,7 @@
             <a:fld id="{22714818-984F-4759-BF72-A33BDC1963BD}" type="datetime1">
               <a:rPr lang="en-US" smtClean="0"/>
               <a:pPr/>
-              <a:t>13-10-2</a:t>
+              <a:t>10/5/2013</a:t>
             </a:fld>
             <a:endParaRPr lang="en-US"/>
           </a:p>
@@ -11312,7 +11312,7 @@
             <a:fld id="{9EA7E191-5F94-4FC1-B823-BD7CABF7FA06}" type="datetime1">
               <a:rPr lang="en-US" smtClean="0"/>
               <a:pPr/>
-              <a:t>13-10-2</a:t>
+              <a:t>10/5/2013</a:t>
             </a:fld>
             <a:endParaRPr lang="en-US"/>
           </a:p>
@@ -14929,7 +14929,7 @@
             <a:fld id="{88856D55-EFBE-4F9B-8A5F-09D42CA22A9B}" type="datetime1">
               <a:rPr lang="en-US" smtClean="0"/>
               <a:pPr/>
-              <a:t>13-10-2</a:t>
+              <a:t>10/5/2013</a:t>
             </a:fld>
             <a:endParaRPr lang="en-US"/>
           </a:p>
@@ -16790,7 +16790,7 @@
             <a:fld id="{9D1D110F-3F4E-48D9-B8AA-5D0E825AFDBA}" type="datetime1">
               <a:rPr lang="en-US" smtClean="0"/>
               <a:pPr/>
-              <a:t>13-10-2</a:t>
+              <a:t>10/5/2013</a:t>
             </a:fld>
             <a:endParaRPr lang="en-US"/>
           </a:p>
@@ -17386,7 +17386,7 @@
   <p:timing>
     <p:tnLst>
       <p:par>
-        <p:cTn xmlns:p14="http://schemas.microsoft.com/office/powerpoint/2010/main" id="1" dur="indefinite" restart="never" nodeType="tmRoot"/>
+        <p:cTn id="1" dur="indefinite" restart="never" nodeType="tmRoot"/>
       </p:par>
     </p:tnLst>
   </p:timing>
@@ -17696,7 +17696,7 @@
   <p:timing>
     <p:tnLst>
       <p:par>
-        <p:cTn xmlns:p14="http://schemas.microsoft.com/office/powerpoint/2010/main" id="1" dur="indefinite" restart="never" nodeType="tmRoot"/>
+        <p:cTn id="1" dur="indefinite" restart="never" nodeType="tmRoot"/>
       </p:par>
     </p:tnLst>
   </p:timing>
@@ -18578,7 +18578,7 @@
   <p:timing>
     <p:tnLst>
       <p:par>
-        <p:cTn xmlns:p14="http://schemas.microsoft.com/office/powerpoint/2010/main" id="1" dur="indefinite" restart="never" nodeType="tmRoot">
+        <p:cTn id="1" dur="indefinite" restart="never" nodeType="tmRoot">
           <p:childTnLst>
             <p:seq concurrent="1" nextAc="seek">
               <p:cTn id="2" dur="indefinite" nodeType="mainSeq">
@@ -19549,7 +19549,7 @@
   <p:timing>
     <p:tnLst>
       <p:par>
-        <p:cTn xmlns:p14="http://schemas.microsoft.com/office/powerpoint/2010/main" id="1" dur="indefinite" restart="never" nodeType="tmRoot"/>
+        <p:cTn id="1" dur="indefinite" restart="never" nodeType="tmRoot"/>
       </p:par>
     </p:tnLst>
   </p:timing>
@@ -19874,7 +19874,7 @@
   <p:timing>
     <p:tnLst>
       <p:par>
-        <p:cTn xmlns:p14="http://schemas.microsoft.com/office/powerpoint/2010/main" id="1" dur="indefinite" restart="never" nodeType="tmRoot"/>
+        <p:cTn id="1" dur="indefinite" restart="never" nodeType="tmRoot"/>
       </p:par>
     </p:tnLst>
   </p:timing>
@@ -20332,7 +20332,7 @@
   <p:timing>
     <p:tnLst>
       <p:par>
-        <p:cTn xmlns:p14="http://schemas.microsoft.com/office/powerpoint/2010/main" id="1" dur="indefinite" restart="never" nodeType="tmRoot"/>
+        <p:cTn id="1" dur="indefinite" restart="never" nodeType="tmRoot"/>
       </p:par>
     </p:tnLst>
   </p:timing>
@@ -20857,7 +20857,7 @@
   <p:timing>
     <p:tnLst>
       <p:par>
-        <p:cTn xmlns:p14="http://schemas.microsoft.com/office/powerpoint/2010/main" id="1" dur="indefinite" restart="never" nodeType="tmRoot"/>
+        <p:cTn id="1" dur="indefinite" restart="never" nodeType="tmRoot"/>
       </p:par>
     </p:tnLst>
   </p:timing>
@@ -21712,7 +21712,7 @@
   <p:timing>
     <p:tnLst>
       <p:par>
-        <p:cTn xmlns:p14="http://schemas.microsoft.com/office/powerpoint/2010/main" id="1" dur="indefinite" restart="never" nodeType="tmRoot">
+        <p:cTn id="1" dur="indefinite" restart="never" nodeType="tmRoot">
           <p:childTnLst>
             <p:seq concurrent="1" nextAc="seek">
               <p:cTn id="2" dur="indefinite" nodeType="mainSeq">
@@ -22328,7 +22328,7 @@
   <p:timing>
     <p:tnLst>
       <p:par>
-        <p:cTn xmlns:p14="http://schemas.microsoft.com/office/powerpoint/2010/main" id="1" dur="indefinite" restart="never" nodeType="tmRoot"/>
+        <p:cTn id="1" dur="indefinite" restart="never" nodeType="tmRoot"/>
       </p:par>
     </p:tnLst>
   </p:timing>
@@ -22791,7 +22791,7 @@
   <p:timing>
     <p:tnLst>
       <p:par>
-        <p:cTn xmlns:p14="http://schemas.microsoft.com/office/powerpoint/2010/main" id="1" dur="indefinite" restart="never" nodeType="tmRoot"/>
+        <p:cTn id="1" dur="indefinite" restart="never" nodeType="tmRoot"/>
       </p:par>
     </p:tnLst>
   </p:timing>
@@ -23371,7 +23371,7 @@
   <p:timing>
     <p:tnLst>
       <p:par>
-        <p:cTn xmlns:p14="http://schemas.microsoft.com/office/powerpoint/2010/main" id="1" dur="indefinite" restart="never" nodeType="tmRoot"/>
+        <p:cTn id="1" dur="indefinite" restart="never" nodeType="tmRoot"/>
       </p:par>
     </p:tnLst>
   </p:timing>
@@ -23474,15 +23474,7 @@
                 <a:ea typeface="Heiti SC Light"/>
                 <a:cs typeface="Heiti SC Light"/>
               </a:rPr>
-              <a:t>对象的</a:t>
-            </a:r>
-            <a:r>
-              <a:rPr kumimoji="1" lang="zh-CN" altLang="en-US" dirty="0" smtClean="0">
-                <a:latin typeface="Heiti SC Light"/>
-                <a:ea typeface="Heiti SC Light"/>
-                <a:cs typeface="Heiti SC Light"/>
-              </a:rPr>
-              <a:t>用法</a:t>
+              <a:t>对象的用法</a:t>
             </a:r>
             <a:endParaRPr kumimoji="1" lang="en-US" altLang="zh-CN" dirty="0" smtClean="0">
               <a:latin typeface="Heiti SC Light"/>
@@ -23805,7 +23797,7 @@
   <p:timing>
     <p:tnLst>
       <p:par>
-        <p:cTn xmlns:p14="http://schemas.microsoft.com/office/powerpoint/2010/main" id="1" dur="indefinite" restart="never" nodeType="tmRoot"/>
+        <p:cTn id="1" dur="indefinite" restart="never" nodeType="tmRoot"/>
       </p:par>
     </p:tnLst>
   </p:timing>
@@ -24298,7 +24290,7 @@
   <p:timing>
     <p:tnLst>
       <p:par>
-        <p:cTn xmlns:p14="http://schemas.microsoft.com/office/powerpoint/2010/main" id="1" dur="indefinite" restart="never" nodeType="tmRoot"/>
+        <p:cTn id="1" dur="indefinite" restart="never" nodeType="tmRoot"/>
       </p:par>
     </p:tnLst>
   </p:timing>
@@ -24804,7 +24796,7 @@
   <p:timing>
     <p:tnLst>
       <p:par>
-        <p:cTn xmlns:p14="http://schemas.microsoft.com/office/powerpoint/2010/main" id="1" dur="indefinite" restart="never" nodeType="tmRoot"/>
+        <p:cTn id="1" dur="indefinite" restart="never" nodeType="tmRoot"/>
       </p:par>
     </p:tnLst>
   </p:timing>
@@ -25004,15 +24996,7 @@
                 <a:ea typeface="Heiti SC Light"/>
                 <a:cs typeface="Heiti SC Light"/>
               </a:rPr>
-              <a:t>b</a:t>
-            </a:r>
-            <a:r>
-              <a:rPr kumimoji="1" lang="en-US" altLang="zh-CN" dirty="0" smtClean="0">
-                <a:latin typeface="Heiti SC Light"/>
-                <a:ea typeface="Heiti SC Light"/>
-                <a:cs typeface="Heiti SC Light"/>
-              </a:rPr>
-              <a:t>ind()</a:t>
+              <a:t>bind()</a:t>
             </a:r>
             <a:r>
               <a:rPr kumimoji="1" lang="zh-CN" altLang="en-US" dirty="0" smtClean="0">
@@ -25258,7 +25242,7 @@
   <p:timing>
     <p:tnLst>
       <p:par>
-        <p:cTn xmlns:p14="http://schemas.microsoft.com/office/powerpoint/2010/main" id="1" dur="indefinite" restart="never" nodeType="tmRoot"/>
+        <p:cTn id="1" dur="indefinite" restart="never" nodeType="tmRoot"/>
       </p:par>
     </p:tnLst>
   </p:timing>
@@ -25576,7 +25560,7 @@
   <p:timing>
     <p:tnLst>
       <p:par>
-        <p:cTn xmlns:p14="http://schemas.microsoft.com/office/powerpoint/2010/main" id="1" dur="indefinite" restart="never" nodeType="tmRoot"/>
+        <p:cTn id="1" dur="indefinite" restart="never" nodeType="tmRoot"/>
       </p:par>
     </p:tnLst>
   </p:timing>
@@ -25989,7 +25973,7 @@
   <p:timing>
     <p:tnLst>
       <p:par>
-        <p:cTn xmlns:p14="http://schemas.microsoft.com/office/powerpoint/2010/main" id="1" dur="indefinite" restart="never" nodeType="tmRoot"/>
+        <p:cTn id="1" dur="indefinite" restart="never" nodeType="tmRoot"/>
       </p:par>
     </p:tnLst>
   </p:timing>
@@ -26358,7 +26342,7 @@
   <p:timing>
     <p:tnLst>
       <p:par>
-        <p:cTn xmlns:p14="http://schemas.microsoft.com/office/powerpoint/2010/main" id="1" dur="indefinite" restart="never" nodeType="tmRoot"/>
+        <p:cTn id="1" dur="indefinite" restart="never" nodeType="tmRoot"/>
       </p:par>
     </p:tnLst>
   </p:timing>
@@ -26752,7 +26736,7 @@
   <p:timing>
     <p:tnLst>
       <p:par>
-        <p:cTn xmlns:p14="http://schemas.microsoft.com/office/powerpoint/2010/main" id="1" dur="indefinite" restart="never" nodeType="tmRoot"/>
+        <p:cTn id="1" dur="indefinite" restart="never" nodeType="tmRoot"/>
       </p:par>
     </p:tnLst>
   </p:timing>
@@ -27017,7 +27001,7 @@
   <p:timing>
     <p:tnLst>
       <p:par>
-        <p:cTn xmlns:p14="http://schemas.microsoft.com/office/powerpoint/2010/main" id="1" dur="indefinite" restart="never" nodeType="tmRoot">
+        <p:cTn id="1" dur="indefinite" restart="never" nodeType="tmRoot">
           <p:childTnLst>
             <p:seq concurrent="1" nextAc="seek">
               <p:cTn id="2" dur="indefinite" nodeType="mainSeq">
@@ -27258,7 +27242,7 @@
   <p:timing>
     <p:tnLst>
       <p:par>
-        <p:cTn xmlns:p14="http://schemas.microsoft.com/office/powerpoint/2010/main" id="1" dur="indefinite" restart="never" nodeType="tmRoot"/>
+        <p:cTn id="1" dur="indefinite" restart="never" nodeType="tmRoot"/>
       </p:par>
     </p:tnLst>
   </p:timing>
@@ -27497,7 +27481,7 @@
   <p:timing>
     <p:tnLst>
       <p:par>
-        <p:cTn xmlns:p14="http://schemas.microsoft.com/office/powerpoint/2010/main" id="1" dur="indefinite" restart="never" nodeType="tmRoot"/>
+        <p:cTn id="1" dur="indefinite" restart="never" nodeType="tmRoot"/>
       </p:par>
     </p:tnLst>
   </p:timing>
@@ -27717,15 +27701,7 @@
                 <a:ea typeface="Heiti SC Light"/>
                 <a:cs typeface="Heiti SC Light"/>
               </a:rPr>
-              <a:t>执行</a:t>
-            </a:r>
-            <a:r>
-              <a:rPr kumimoji="1" lang="zh-CN" altLang="en-US" dirty="0" smtClean="0">
-                <a:latin typeface="Heiti SC Light"/>
-                <a:ea typeface="Heiti SC Light"/>
-                <a:cs typeface="Heiti SC Light"/>
-              </a:rPr>
-              <a:t>超快速</a:t>
+              <a:t>执行超快速</a:t>
             </a:r>
             <a:endParaRPr kumimoji="1" lang="en-US" altLang="zh-CN" dirty="0">
               <a:latin typeface="Heiti SC Light"/>
@@ -28154,7 +28130,7 @@
   <p:timing>
     <p:tnLst>
       <p:par>
-        <p:cTn xmlns:p14="http://schemas.microsoft.com/office/powerpoint/2010/main" id="1" dur="indefinite" restart="never" nodeType="tmRoot"/>
+        <p:cTn id="1" dur="indefinite" restart="never" nodeType="tmRoot"/>
       </p:par>
     </p:tnLst>
   </p:timing>
@@ -28201,15 +28177,7 @@
                 <a:ea typeface="Heiti SC Light"/>
                 <a:cs typeface="Heiti SC Light"/>
               </a:rPr>
-              <a:t>set</a:t>
-            </a:r>
-            <a:r>
-              <a:rPr kumimoji="1" lang="en-US" altLang="zh-CN" dirty="0" err="1" smtClean="0">
-                <a:latin typeface="Heiti SC Light"/>
-                <a:ea typeface="Heiti SC Light"/>
-                <a:cs typeface="Heiti SC Light"/>
-              </a:rPr>
-              <a:t>Timeout</a:t>
+              <a:t>setTimeout</a:t>
             </a:r>
             <a:r>
               <a:rPr kumimoji="1" lang="en-US" altLang="zh-CN" dirty="0" smtClean="0">
@@ -28430,7 +28398,7 @@
   <p:timing>
     <p:tnLst>
       <p:par>
-        <p:cTn xmlns:p14="http://schemas.microsoft.com/office/powerpoint/2010/main" id="1" dur="indefinite" restart="never" nodeType="tmRoot"/>
+        <p:cTn id="1" dur="indefinite" restart="never" nodeType="tmRoot"/>
       </p:par>
     </p:tnLst>
   </p:timing>
@@ -28477,15 +28445,7 @@
                 <a:ea typeface="Heiti SC Light"/>
                 <a:cs typeface="Heiti SC Light"/>
               </a:rPr>
-              <a:t>set</a:t>
-            </a:r>
-            <a:r>
-              <a:rPr kumimoji="1" lang="en-US" altLang="zh-CN" dirty="0" err="1" smtClean="0">
-                <a:latin typeface="Heiti SC Light"/>
-                <a:ea typeface="Heiti SC Light"/>
-                <a:cs typeface="Heiti SC Light"/>
-              </a:rPr>
-              <a:t>Timeout</a:t>
+              <a:t>setTimeout</a:t>
             </a:r>
             <a:r>
               <a:rPr kumimoji="1" lang="en-US" altLang="zh-CN" dirty="0" smtClean="0">
@@ -28548,7 +28508,7 @@
   <p:timing>
     <p:tnLst>
       <p:par>
-        <p:cTn xmlns:p14="http://schemas.microsoft.com/office/powerpoint/2010/main" id="1" dur="indefinite" restart="never" nodeType="tmRoot"/>
+        <p:cTn id="1" dur="indefinite" restart="never" nodeType="tmRoot"/>
       </p:par>
     </p:tnLst>
   </p:timing>
@@ -28881,7 +28841,7 @@
   <p:timing>
     <p:tnLst>
       <p:par>
-        <p:cTn xmlns:p14="http://schemas.microsoft.com/office/powerpoint/2010/main" id="1" dur="indefinite" restart="never" nodeType="tmRoot"/>
+        <p:cTn id="1" dur="indefinite" restart="never" nodeType="tmRoot"/>
       </p:par>
     </p:tnLst>
   </p:timing>
@@ -28951,7 +28911,7 @@
         <p:spPr>
           <a:xfrm>
             <a:off x="872067" y="2449054"/>
-            <a:ext cx="7408333" cy="3677109"/>
+            <a:ext cx="4971521" cy="3677109"/>
           </a:xfrm>
         </p:spPr>
         <p:txBody>
@@ -29367,6 +29327,60 @@
           </a:p>
         </p:txBody>
       </p:sp>
+      <p:pic>
+        <p:nvPicPr>
+          <p:cNvPr id="1026" name="Picture 2"/>
+          <p:cNvPicPr>
+            <a:picLocks noChangeAspect="1" noChangeArrowheads="1"/>
+          </p:cNvPicPr>
+          <p:nvPr/>
+        </p:nvPicPr>
+        <p:blipFill>
+          <a:blip r:embed="rId3" cstate="email">
+            <a:extLst>
+              <a:ext uri="{28A0092B-C50C-407E-A947-70E740481C1C}">
+                <a14:useLocalDpi xmlns:a14="http://schemas.microsoft.com/office/drawing/2010/main" val="0"/>
+              </a:ext>
+            </a:extLst>
+          </a:blip>
+          <a:srcRect/>
+          <a:stretch>
+            <a:fillRect/>
+          </a:stretch>
+        </p:blipFill>
+        <p:spPr bwMode="auto">
+          <a:xfrm>
+            <a:off x="6172201" y="2786062"/>
+            <a:ext cx="2257424" cy="2962600"/>
+          </a:xfrm>
+          <a:prstGeom prst="rect">
+            <a:avLst/>
+          </a:prstGeom>
+          <a:noFill/>
+          <a:ln>
+            <a:noFill/>
+          </a:ln>
+          <a:extLst>
+            <a:ext uri="{909E8E84-426E-40DD-AFC4-6F175D3DCCD1}">
+              <a14:hiddenFill xmlns:a14="http://schemas.microsoft.com/office/drawing/2010/main">
+                <a:solidFill>
+                  <a:schemeClr val="accent1"/>
+                </a:solidFill>
+              </a14:hiddenFill>
+            </a:ext>
+            <a:ext uri="{91240B29-F687-4F45-9708-019B960494DF}">
+              <a14:hiddenLine xmlns:a14="http://schemas.microsoft.com/office/drawing/2010/main" w="9525">
+                <a:solidFill>
+                  <a:schemeClr val="tx1"/>
+                </a:solidFill>
+                <a:miter lim="800000"/>
+                <a:headEnd/>
+                <a:tailEnd/>
+              </a14:hiddenLine>
+            </a:ext>
+          </a:extLst>
+        </p:spPr>
+      </p:pic>
     </p:spTree>
     <p:extLst>
       <p:ext uri="{BB962C8B-B14F-4D97-AF65-F5344CB8AC3E}">
@@ -29380,7 +29394,7 @@
   <p:timing>
     <p:tnLst>
       <p:par>
-        <p:cTn xmlns:p14="http://schemas.microsoft.com/office/powerpoint/2010/main" id="1" dur="indefinite" restart="never" nodeType="tmRoot"/>
+        <p:cTn id="1" dur="indefinite" restart="never" nodeType="tmRoot"/>
       </p:par>
     </p:tnLst>
   </p:timing>
@@ -29693,7 +29707,7 @@
   <p:timing>
     <p:tnLst>
       <p:par>
-        <p:cTn xmlns:p14="http://schemas.microsoft.com/office/powerpoint/2010/main" id="1" dur="indefinite" restart="never" nodeType="tmRoot"/>
+        <p:cTn id="1" dur="indefinite" restart="never" nodeType="tmRoot"/>
       </p:par>
     </p:tnLst>
   </p:timing>
@@ -30042,7 +30056,7 @@
   <p:timing>
     <p:tnLst>
       <p:par>
-        <p:cTn xmlns:p14="http://schemas.microsoft.com/office/powerpoint/2010/main" id="1" dur="indefinite" restart="never" nodeType="tmRoot"/>
+        <p:cTn id="1" dur="indefinite" restart="never" nodeType="tmRoot"/>
       </p:par>
     </p:tnLst>
   </p:timing>
@@ -30132,11 +30146,6 @@
               </a:rPr>
               <a:t>Oriented</a:t>
             </a:r>
-            <a:endParaRPr kumimoji="1" lang="en-US" altLang="zh-CN" dirty="0" smtClean="0">
-              <a:latin typeface="Heiti SC Light"/>
-              <a:ea typeface="Heiti SC Light"/>
-              <a:cs typeface="Heiti SC Light"/>
-            </a:endParaRPr>
           </a:p>
           <a:p>
             <a:pPr lvl="1">
@@ -30359,15 +30368,7 @@
                 <a:ea typeface="Heiti SC Light"/>
                 <a:cs typeface="Heiti SC Light"/>
               </a:rPr>
-              <a:t>其实属于那种类型并不重要，关键是掌握</a:t>
-            </a:r>
-            <a:r>
-              <a:rPr kumimoji="1" lang="zh-CN" altLang="en-US" dirty="0" smtClean="0">
-                <a:latin typeface="Heiti SC Light"/>
-                <a:ea typeface="Heiti SC Light"/>
-                <a:cs typeface="Heiti SC Light"/>
-              </a:rPr>
-              <a:t>特性</a:t>
+              <a:t>其实属于那种类型并不重要，关键是掌握特性</a:t>
             </a:r>
             <a:endParaRPr kumimoji="1" lang="en-US" altLang="zh-CN" dirty="0" smtClean="0">
               <a:latin typeface="Heiti SC Light"/>
@@ -30679,7 +30680,7 @@
   <p:timing>
     <p:tnLst>
       <p:par>
-        <p:cTn xmlns:p14="http://schemas.microsoft.com/office/powerpoint/2010/main" id="1" dur="indefinite" restart="never" nodeType="tmRoot">
+        <p:cTn id="1" dur="indefinite" restart="never" nodeType="tmRoot">
           <p:childTnLst>
             <p:seq concurrent="1" nextAc="seek">
               <p:cTn id="2" dur="indefinite" nodeType="mainSeq">
@@ -31219,11 +31220,6 @@
               </a:rPr>
               <a:t>);</a:t>
             </a:r>
-            <a:endParaRPr kumimoji="1" lang="en-US" altLang="zh-CN" sz="2000" dirty="0">
-              <a:latin typeface="Heiti SC Light"/>
-              <a:ea typeface="Heiti SC Light"/>
-              <a:cs typeface="Heiti SC Light"/>
-            </a:endParaRPr>
           </a:p>
         </p:txBody>
       </p:sp>
@@ -31494,7 +31490,7 @@
   <p:timing>
     <p:tnLst>
       <p:par>
-        <p:cTn xmlns:p14="http://schemas.microsoft.com/office/powerpoint/2010/main" id="1" dur="indefinite" restart="never" nodeType="tmRoot"/>
+        <p:cTn id="1" dur="indefinite" restart="never" nodeType="tmRoot"/>
       </p:par>
     </p:tnLst>
   </p:timing>
@@ -31993,7 +31989,7 @@
   <p:timing>
     <p:tnLst>
       <p:par>
-        <p:cTn xmlns:p14="http://schemas.microsoft.com/office/powerpoint/2010/main" id="1" dur="indefinite" restart="never" nodeType="tmRoot"/>
+        <p:cTn id="1" dur="indefinite" restart="never" nodeType="tmRoot"/>
       </p:par>
     </p:tnLst>
   </p:timing>
@@ -32710,7 +32706,7 @@
   <p:timing>
     <p:tnLst>
       <p:par>
-        <p:cTn xmlns:p14="http://schemas.microsoft.com/office/powerpoint/2010/main" id="1" dur="indefinite" restart="never" nodeType="tmRoot">
+        <p:cTn id="1" dur="indefinite" restart="never" nodeType="tmRoot">
           <p:childTnLst>
             <p:seq concurrent="1" nextAc="seek">
               <p:cTn id="2" dur="indefinite" nodeType="mainSeq">

</xml_diff>